<commit_message>
Cleaned the codes and writing and added checks for linearity assumptions
</commit_message>
<xml_diff>
--- a/Final_Presentation_Multivariate.pptx
+++ b/Final_Presentation_Multivariate.pptx
@@ -933,11 +933,49 @@
           </a:bodyPr>
           <a:lstStyle/>
           <a:p>
-            <a:pPr marL="158750" indent="0">
-              <a:buFont typeface="+mj-lt"/>
+            <a:pPr marL="0" lvl="0" indent="0" algn="l" rtl="0">
+              <a:spcBef>
+                <a:spcPts val="0"/>
+              </a:spcBef>
+              <a:spcAft>
+                <a:spcPts val="0"/>
+              </a:spcAft>
               <a:buNone/>
             </a:pPr>
-            <a:endParaRPr lang="en-US" dirty="0"/>
+            <a:r>
+              <a:rPr lang="en-US" dirty="0"/>
+              <a:t>Age = 20.14, SD = 3.4</a:t>
+            </a:r>
+          </a:p>
+          <a:p>
+            <a:pPr marL="0" lvl="0" indent="0" algn="l" rtl="0">
+              <a:spcBef>
+                <a:spcPts val="0"/>
+              </a:spcBef>
+              <a:spcAft>
+                <a:spcPts val="0"/>
+              </a:spcAft>
+              <a:buNone/>
+            </a:pPr>
+            <a:r>
+              <a:rPr lang="en-US" dirty="0"/>
+              <a:t>Male = 24%, Female = 73%</a:t>
+            </a:r>
+          </a:p>
+          <a:p>
+            <a:pPr marL="0" lvl="0" indent="0" algn="l" rtl="0">
+              <a:spcBef>
+                <a:spcPts val="0"/>
+              </a:spcBef>
+              <a:spcAft>
+                <a:spcPts val="0"/>
+              </a:spcAft>
+              <a:buNone/>
+            </a:pPr>
+            <a:r>
+              <a:rPr lang="en-US" dirty="0"/>
+              <a:t>White = 51%, Black = 17%</a:t>
+            </a:r>
           </a:p>
         </p:txBody>
       </p:sp>
@@ -1554,7 +1592,7 @@
               </a:spcAft>
               <a:buNone/>
             </a:pPr>
-            <a:endParaRPr/>
+            <a:endParaRPr dirty="0"/>
           </a:p>
         </p:txBody>
       </p:sp>
@@ -43391,13 +43429,13 @@
   <p:clrMapOvr>
     <a:masterClrMapping/>
   </p:clrMapOvr>
-  <mc:AlternateContent xmlns:mc="http://schemas.openxmlformats.org/markup-compatibility/2006">
-    <mc:Choice xmlns:p159="http://schemas.microsoft.com/office/powerpoint/2015/09/main" Requires="p159">
+  <mc:AlternateContent xmlns:mc="http://schemas.openxmlformats.org/markup-compatibility/2006" xmlns:p159="http://schemas.microsoft.com/office/powerpoint/2015/09/main">
+    <mc:Choice Requires="p159">
       <p:transition xmlns:p14="http://schemas.microsoft.com/office/powerpoint/2010/main" spd="slow" p14:dur="2000">
         <p159:morph option="byObject"/>
       </p:transition>
     </mc:Choice>
-    <mc:Fallback>
+    <mc:Fallback xmlns="">
       <p:transition spd="slow">
         <p:fade/>
       </p:transition>

</xml_diff>